<commit_message>
IT008: Add 2 old projects
</commit_message>
<xml_diff>
--- a/SE357-Requirement engineering/Slides/Thực hành/Lab 1. RE tool.pptx
+++ b/SE357-Requirement engineering/Slides/Thực hành/Lab 1. RE tool.pptx
@@ -136,6 +136,124 @@
 </p:presentation>
 </file>
 
+<file path=ppt/ink/ink1.xml><?xml version="1.0" encoding="utf-8"?>
+<inkml:ink xmlns:inkml="http://www.w3.org/2003/InkML">
+  <inkml:definitions>
+    <inkml:context xml:id="ctx0">
+      <inkml:inkSource xml:id="inkSrc0">
+        <inkml:traceFormat>
+          <inkml:channel name="X" type="integer" min="-2.14748E9" max="2.14748E9" units="cm"/>
+          <inkml:channel name="Y" type="integer" min="-2.14748E9" max="2.14748E9" units="cm"/>
+          <inkml:channel name="F" type="integer" max="32767" units="dev"/>
+        </inkml:traceFormat>
+        <inkml:channelProperties>
+          <inkml:channelProperty channel="X" name="resolution" value="1000" units="1/cm"/>
+          <inkml:channelProperty channel="Y" name="resolution" value="1000" units="1/cm"/>
+          <inkml:channelProperty channel="F" name="resolution" value="0" units="1/dev"/>
+        </inkml:channelProperties>
+      </inkml:inkSource>
+      <inkml:timestamp xml:id="ts0" timeString="2023-10-05T08:08:45.987"/>
+    </inkml:context>
+    <inkml:brush xml:id="br0">
+      <inkml:brushProperty name="width" value="0.05292" units="cm"/>
+      <inkml:brushProperty name="height" value="0.05292" units="cm"/>
+      <inkml:brushProperty name="color" value="#FF0000"/>
+    </inkml:brush>
+  </inkml:definitions>
+  <inkml:trace contextRef="#ctx0" brushRef="#br0">3281 10081 24575,'40'11'0,"-1"1"0,29-6 0,-15 18 0,-3-24 0,-21 0 0,21 0 0,-32 0 0,41 0 0,-27 0 0,9 0 0,-6 0 0,-8 0 0,2 0 0,45 0 0,-39 0 0,38 0 0,-55 0 0,17 0 0,-8 0 0,2 0 0,-2 0 0,8 0 0,-6 0 0,36 0 0,3 0 0,-24 11 0,26-8 0,-26 33 0,24-31 0,-29 8 0,-2-2 0,8-11 0,16 0 0,-20 0 0,8 0 0,2 0 0,-13-1 0,1 2 0,20 5 0,-4 0 0,-10-3 0,25 8 0,-38-11-3392,11 0 0,3 0 3392,12 0 0,7 0 0,15 0 0,-7 0-522,-12 0 0,1 0 522,2 0 0,10 0 0,2 0 0,-4 0 0,1 0 0,-2 0 0,-1 0-906,3 0 0,1 0 0,0 0 906,-16 0 0,1 0 0,0 0 0,-3 0 0,6 0 0,-2 0 0,3 0 0,1 0 0,3-1 0,2 1 0,-1 1-489,-3 4 1,-1 1 0,2 0 0,3 1 488,1-1 0,3-1 0,2 1 0,0 0 0,-3 0 0,-9 0 0,-1 0 0,-1 0 0,1 0 0,1 0 427,-1-1 0,1 1 0,1 0 0,0 0 1,-2 0-1,-3 0-427,9 1 0,-4 0 0,-2-1 0,0 0 215,15 0 1,-2-1 0,-7 2-216,-1 6 0,-10-2 0,-2-11 0,-15 0 0,-3 0 3062,-5 0-3062,15 0 3486,-20 0-3486,26 0 2340,2 0-2340,-2 0 401,-26 0-401,8 0 0,-17 0 0,43 0 0,7 0 0,-21 0 0,-6 0 0,0 0 0,4 0 0,6 0 0,12 0 0,-4 0 0,-9 0 0,3 0 0,6 0 0,12 0 0,1 0 0,-7 0-346,-9 0 0,-5 0 0,4 0 346,5 0 0,4 0 0,0 0 0,-5 0 0,-6 0 0,-4 0 0,2 0 0,17 0 0,5 0 0,-5 0 0,6 0 0,-4 0 0,-6 0 0,-2 0 0,3 0 0,-12 0 0,-33 0 0,54 0 0,-30 0 0,-3 0 1038,-6 0-1038,-8 0 0,26 0 0,14 0 0,1 0 0,-29 1 0,-2-2 0,19-23 0,-15 18 0,18-17 0,-38 11 0,17-15 0,-3 10 0,-17-30 0,8 41 0,10-53 0,-31 50 0,19-61 0,-24 49 0,23-41 0,-17 21 0,18 0 0,-24-9 0,12-3 0,14 9 0,-8-18 0,17 45 0,-32-30 0,9 29 0,-12-32 0,0 21 0,0 2 0,0-20 0,0 38 0,0-49 0,0 52 0,0-18 0,0 24 0,0-12 0,0-14 0,0-15 0,-12 11 0,9-28 0,-9 49 0,-11-38 0,17 20 0,-29 10 0,32-19 0,-9 10 0,-12 8 0,18-29 0,-41 30 0,30-33 0,-33 20 0,32 4 0,-41 14 0,51-12 0,-39 19 0,20-31 0,9 33 0,-29-8 0,30 11 0,-45 0 0,23 0 0,-1 0-509,-2 1 0,-2-2 509,-16-11 0,-6 0 0,7 9 0,-3 3 0,4-3-795,-6-9 0,1 1 795,-13 9 0,2 4 0,28 0 0,7-4 0,4-22 0,-15 18 0,3-17 0,3 23 0,-16 1 0,-7-2 0,16-5 0,-1 0 467,-20 5 0,3-1-467,-1-10 0,18 11 0,-8 2 0,4-1 298,0 0 1,0 0-299,0 0 0,-5 0 0,8 0 0,9 0 0,9 0 0,-1 0 0,13 0 0,17 0 0,-33 0 0,-16 0 0,5 0 0,-4 0 0,-1 0-239,-6 0 0,-2 0 0,-1 0 239,-4 0 0,0 0 0,7 0 518,6 0 1,7 0-519,-14 0 0,33 0 0,2 0 0,-8 0 0,-6 0 757,-27 0-757,6 0 0,-2 0 0,17 0 0,3 0 0,-2 0 0,1 0 0,-26 0 0,62 0 0,-26 0 0,35 0 0,-12 0 0,-49 0 0,-1 0 0,12 2 0,-9-1 0,6-4 0,5-8 0,2-1 0,-20 10 0,6-2 0,18-20 0,-16 24 0,21-4 0,-6-3 0,-21-1 0,-12-2 0,-1 1-738,17 2 0,-1 1 1,0-1-1,2-2 738,2-3 0,0-2 0,2 1 0,3 2 0,-31 3 0,19-2 0,38-13 0,-33 23 0,12 0 0,-21 0 0,7 0 0,8-24 0,-15 18 0,14-1 0,-9-3 0,7 4 0,10 5 0,0 2-229,-11 0 1,-7 0 0,15-3 228,17-10 2836,-39 9-2836,18-2 0,-9-2 0,8 2 0,-8-2 0,-4 1 0,-1 1-484,1 2 0,-3 3 0,-1 0 0,0-1 1,4-1 483,-5-3 0,2-2 0,2 0 0,3 2 0,-12 4 0,3 2 0,13-1 0,-1 0 701,19 0-701,-22 0 0,-4 0-989,12 0 989,11 0 0,-7 0 0,-3 0 0,-6 0 0,-2 0 0,-2 0 0,-2 0 0,-4 0-235,1 0 1,-4 0-1,-3 0 1,1 0 234,14 0 0,-2 0 0,0 0 0,2 0 0,3 0 0,-1 0 0,5 0 0,-2 0 0,-4 0 0,-9 0 0,-5 0 0,-3 0 0,1 0 0,7 0-613,6 0 0,5 0 0,0 0 0,-3 0 613,1 0 0,-2-1 0,-1 0 0,0 1 0,1 2 0,-10 5 0,-1 2 0,3 1 0,4 0 0,-1 0 0,3 0 0,1 2 0,-2 0 0,-1 1 0,9 3 0,7 10 0,8-5 0,-10-15 0,6 18 791,6-13-791,-27 16 0,24-10 1487,9 13 0,0-1-1487,-9-8 1566,22 8 0,-1 4-1566,-35 8 0,52 0 0,-18 9 0,12 3 0,10-21 0,-10 15 0,12-20 0,0-10 0,0 30 0,0-41 0,0 29 0,12-32 0,-10 9 0,34 12 0,5 17 0,15 3 0,-15-6 0,-6-3 0,-32-29 0,32 41 0,-29-41 0,30 29 0,-33-32 0,32 33 0,-29-30 0,29 29 0,-9 3 0,-8-17 0,29 14 0,-41-35 0,53 0 0,-15 0 0,8 0 0,11 0-1749,1 0 1,6 0-1,1 0 1749,-1 0 0,1 0 0,3 0 0,-2 0 0,5 0 0,-1 0 0,-4 0 0,-3-2 0,-3 1 0,5 4 0,-7 4 0,7 5 0,1 1 0,-3 1 0,-10-1-262,15 4 0,-4 4 262,2 3 0,5 3 0,-20-2 0,-22 2 0,-32-15 0,9-12 0,-12 23 5064,0-5-5064,-12 8 706,9 9-706,-9-29 0,12 18 0,0-24 0,0 0 0</inkml:trace>
+</inkml:ink>
+</file>
+
+<file path=ppt/ink/ink2.xml><?xml version="1.0" encoding="utf-8"?>
+<inkml:ink xmlns:inkml="http://www.w3.org/2003/InkML">
+  <inkml:definitions>
+    <inkml:context xml:id="ctx0">
+      <inkml:inkSource xml:id="inkSrc0">
+        <inkml:traceFormat>
+          <inkml:channel name="X" type="integer" min="-2.14748E9" max="2.14748E9" units="cm"/>
+          <inkml:channel name="Y" type="integer" min="-2.14748E9" max="2.14748E9" units="cm"/>
+          <inkml:channel name="F" type="integer" max="32767" units="dev"/>
+        </inkml:traceFormat>
+        <inkml:channelProperties>
+          <inkml:channelProperty channel="X" name="resolution" value="1000" units="1/cm"/>
+          <inkml:channelProperty channel="Y" name="resolution" value="1000" units="1/cm"/>
+          <inkml:channelProperty channel="F" name="resolution" value="0" units="1/dev"/>
+        </inkml:channelProperties>
+      </inkml:inkSource>
+      <inkml:timestamp xml:id="ts0" timeString="2023-10-05T08:10:42.495"/>
+    </inkml:context>
+    <inkml:brush xml:id="br0">
+      <inkml:brushProperty name="width" value="0.05292" units="cm"/>
+      <inkml:brushProperty name="height" value="0.05292" units="cm"/>
+      <inkml:brushProperty name="color" value="#FF0000"/>
+    </inkml:brush>
+  </inkml:definitions>
+  <inkml:trace contextRef="#ctx0" brushRef="#br0">14870 6112 24575,'38'0'0,"15"0"0,14 0 0,1 0 0,-15 0 0,-27 0 0,10 0 0,-31 0 0,31 12 0,-10-9 0,-8 8 0,17-11 0,-32 0 0,56 0 0,-12 0 0,-3 0 0,3 0 0,-7 0 0,-1 0 0,29 0 0,-30 0 0,0 0 0,30 0 0,-28-1 0,-1 2 0,17 23 0,-7-21 0,-1 0 0,2 20 0,-14-21 0,5-4 0,11 2 0,5 0 0,-8 0 0,4 0 0,6 0-373,-1 2 0,6 0 0,4 1 0,-3 0 0,-5-1 373,6-1 0,-4 0 0,1 0 0,-6 1 0,2 0 0,-1 1 0,-6 2 0,16 7 0,-12-1 0,-6-5 0,16 7 0,-3-2 0,-34-11 0,1 0 0,5 0 0,-32-24 1865,32 18-1865,-17-17 0,8 23 0,-14 0 0,12 0 0,-18 0 0,29 0 0,-32 0 0,32 0 0,-29 0 0,17 0 0,1-12 0,-18 9 0,17-9 0,-11 12 0,-9 0 0,32 0 0,-29 0 0,53 0 0,-38 0 0,40 0 0,-31 0 0,20 0 0,-9-23 0,-12 17 0,7-18 0,-10 24 0,3 0 0,-2 0 0,8 0 0,-17 0 0,8 0 0,33 0 0,-35 0 0,26 0 0,-15 0 0,-29-11 0,29 8 0,-3-26 0,-2-1 0,-4 18 0,4-13 0,-1 3 0,-6 22 0,-5-12 0,9 9 0,8-8 0,-29 11 0,17-24 0,-23 18 0,12-29 0,14-3 0,4-6 0,-4-21 0,-14 36 0,-12-7 0,0 33 0,0-32 0,0 17 0,0-8 0,0-21 0,0 15 0,-12-33 0,-14 0 0,1 31 0,-3 1 0,-16-23 0,11 24 0,4 2 0,11 1 0,-29 2 0,42-8 0,-31 5 0,-2-11 0,-6-9 0,3 33 0,6-7 0,32 12 0,-33 9 0,7-8 0,-12-13 0,-9 18 0,-3-17 0,9 23 0,2 0 0,-1 0 0,-16 0 0,-9 0 0,19-4 0,1-4 0,-14-18 0,18 17 0,-3 0 0,-8-15 0,-1 1 0,2 18 0,-4 4 0,-10-6 0,-8-2 0,2 2-807,17 2 1,2 1 0,-6 1 806,-1 1 0,-7 2 0,-3 0 0,2 0 0,8-1 0,-3-2 0,7-1 0,-7-1 0,7 1 0,-8 0 0,-4 0 0,1-1 0,4 2 0,10 0 0,1 1 0,7 0 0,-2 0-471,-18-6 0,-4-2 1,12 4 470,-2 6 0,43 0 0,-17 0 0,32 0 0,-32-12 2230,-7 9-2230,-13-8 0,-5 9 0,-4 4 0,18-2 0,1 0 0,-9 0 0,2 0 0,-21 0 1601,55 0-1601,-17 0 0,8 11 0,-2-8 0,-21 9 0,9 12 0,0 17 0,-9 15 0,20-3 0,-20-27 0,21 9 0,2-29 0,-8 18 0,29-13 0,-17-8 0,-1 9 0,18 12 0,-29-7 0,32 33 0,-32-32 0,17 29 0,-8-29 0,-10 43 0,19-40 0,-10 38 0,16-53 0,-13 17 0,18-11 0,-41-9 0,41 9 0,-17 11 0,11-5 0,9 32 0,-32-33 0,29 30 0,-18-41 0,24 53 0,-11-38 0,8 17 0,-9-3 0,12-29 0,0 29 0,0-32 0,0 9 0</inkml:trace>
+  <inkml:trace contextRef="#ctx0" brushRef="#br0" timeOffset="14258">16933 6429 24575,'30'0'0,"-7"24"0,-23 17 0,12 3 0,6 4 0,2 1 0,1 13 0,-2-28 0,-3 0 0,-16 24 0,0-52 0,0 29 0,0-32 0,0 33 0,0-30 0,0 41 0,-12-30 0,9 10 0,-32 8 0,17-17 0,-32 8 0,33 9 0,-7-29 0,1 18 0,17-24 0,-29 12 0,8-10 0,-2 10 0,-21-12 0,20 24 0,-20-18 0,-2 17 0,-4-23 0,3 0 0,3 0 0,20 0 0,-43 0 0,38 0 0,-39 0 0,56 24 0,-17-18 0,9 17 0,8-23 0,-17 0 0,8 0 0,-14 0 0,-23 0 0,-4 12 0,27-11 0,3 1 0,-7 10 0,-25-12 0,26 0 0,-24 23 0,15-17 0,3 17 0,33-23 0,-19 0 0,10 0 0,8 0 0,-29 0 0,30 0 0,-33 0 0,32 0 0,-17 0 0,32-23 0,-33 17 0,19-17 0,-33 23 0,32 0 0,-5-12 0,-1 9 0,18-9 0,-52-11 0,49 17 0,-38-41 0,44 41 0,-33-18 0,31 12 0,-31 10 0,10-10 0,-15-12 0,0 18 0,-9-29 0,20 32 0,4-9 0,14-11 0,-12 17 0,19-29 0,-31 44 0,33-30 0,-8 30 0,-13-45 0,18 7 0,-17 0 0,-1-7 0,18 10 0,-17 8 0,23-17 0,-12 32 0,9-32 0,-9 29 0,12-18 0,0-11 0,-23 3 0,17-21 0,-18 26 0,24-8 0,0 29 0,0-17 0,0 11 0,0-14 0,0 8 0,0-17 0,0 8 0,0 10 0,0-7 0,0 0 0,24 19 0,-18-19 0,17 24 0,-23-12 0,0 9 0,12-8 0,-9-13 0,32 18 0,-29-29 0,41 32 0,-29-9 0,8 12 0,10 0 0,-31 0 0,19 0 0,-12 0 0,-9 0 0,32 0 0,-29 0 0,29 0 0,-32 0 0,9 0 0,11 0 0,-17 0 0,41 0 0,-41 0 0,29 0 0,-32 0 0,9 0 0,-12 0 0</inkml:trace>
+</inkml:ink>
+</file>
+
+<file path=ppt/ink/ink3.xml><?xml version="1.0" encoding="utf-8"?>
+<inkml:ink xmlns:inkml="http://www.w3.org/2003/InkML">
+  <inkml:definitions>
+    <inkml:context xml:id="ctx0">
+      <inkml:inkSource xml:id="inkSrc0">
+        <inkml:traceFormat>
+          <inkml:channel name="X" type="integer" min="-2.14748E9" max="2.14748E9" units="cm"/>
+          <inkml:channel name="Y" type="integer" min="-2.14748E9" max="2.14748E9" units="cm"/>
+          <inkml:channel name="F" type="integer" max="32767" units="dev"/>
+        </inkml:traceFormat>
+        <inkml:channelProperties>
+          <inkml:channelProperty channel="X" name="resolution" value="1000" units="1/cm"/>
+          <inkml:channelProperty channel="Y" name="resolution" value="1000" units="1/cm"/>
+          <inkml:channelProperty channel="F" name="resolution" value="0" units="1/dev"/>
+        </inkml:channelProperties>
+      </inkml:inkSource>
+      <inkml:timestamp xml:id="ts0" timeString="2023-10-05T08:11:34.999"/>
+    </inkml:context>
+    <inkml:brush xml:id="br0">
+      <inkml:brushProperty name="width" value="0.05292" units="cm"/>
+      <inkml:brushProperty name="height" value="0.05292" units="cm"/>
+      <inkml:brushProperty name="color" value="#FF0000"/>
+    </inkml:brush>
+  </inkml:definitions>
+  <inkml:trace contextRef="#ctx0" brushRef="#br0">4286 8996 24575,'74'0'0,"-35"-1"0,7 2 0,12 3 0,14 3 0,2 0 0,-5-2-637,1-2 1,-4-2 0,1 1 636,-7 4 0,3 1 0,-3-1 0,-8-1 0,3-5 0,-13 0 616,-6 0-616,-30 0 315,17 0-315,-11 0 0,-9 0 0,32 0 978,-17 0-978,32 0 0,3 0 0,14 0 0,-16 0 0,1 0 0,22 0 0,-34 0 0,-4 0 0,-9 0 0,8 0 0,-29-24 0,29 18 0,3-17 0,6 23 0,-3 0 0,18 0 0,-26 0 0,19 0 0,-25 0 0,8 0 0,-29 0 0,18 0 0,-13 0 0,16 0 0,14 23 0,0-17 0,0 7 0,9 5 0,3-2-965,11-1 0,5-1 1,4-2 964,-17-3 0,4 0 0,1-1 0,1 1 0,-1 1 0,-1 1 0,0 3 0,0 0 0,-1-2 0,-4-2 0,17-2 0,-5-4 0,-6 2 0,-6 7 0,-7-3 0,10-10 0,-40 0 0,44 0 0,-42 0 0,39 0 0,-29 0 2894,11 0-2894,7 0 0,1 0 0,4 0 0,-2 0 0,-2 0 0,-20 0 0,30 0 0,-39 0 0,42 0 0,-9 0 0,-21 0 0,39 0 0,-39 12 0,6-10 0,1-1 0,5 11 0,18-12 0,-45 0 0,30 0 0,-29 0 0,8 0 0,10 0 0,-19 0 0,10 0 0,-16 0 0,13-12 0,-18 9 0,17-9 0,-23-11 0,12 17 0,-9-17 0,32 23 0,-29 0 0,18 0 0,-1 0 0,-17 0 0,18 0 0,-13 0 0,-8-12 0,33 9 0,-30-9 0,29 12 0,-32 0 0,32 0 0,-29-23 0,17 17 0,-11-18 0,-9 24 0,32 0 0,-29 0 0,18 0 0,-1 0 0,-17 0 0,18-12 0,-24 9 0,11-8 0,-8-13 0,9 18 0,12-17 0,-18-1 0,29 18 0,-32-29 0,32 32 0,-29-32 0,17 29 0,-23-29 0,0 32 0,0-33 0,0 31 0,0-31 0,0 10 0,0-27 0,0 21 0,0-27 0,0 53 0,0-29 0,-23 8 0,17-2 0,-17-21 0,11 9 0,9 0 0,-9 14 0,12 15 0,0-11 0,-23 17 0,17-29 0,-18 32 0,24-9 0,0-12 0,-12 7 0,9-33 0,-32 32 0,29-5 0,-41-1 0,30 6 0,-45-8 0,41-9 0,-37 29 0,40-29 0,-56 32 0,51-9 0,-20 1 0,4-2 0,30-4 0,-38-10 0,20 16 0,10 11 0,-7 0 0,-11 0 0,2 0 0,-5 0 0,0 0 0,6 0 0,-15 0 0,20 0 0,-2 0 0,-21-24 0,-3 18 0,6-5 0,-9-1 0,5 4 0,-8 2 0,-2 0 0,3 2-763,-3 2 0,2 2 0,-6-4 763,-1-4 0,-8-5 0,-2-1 0,1 1 0,7 2 0,-7 3 0,6 3 0,-5-2 0,14 0 0,-5-2 0,0 1 0,2 0 0,8 2 0,-23 0 0,9 0-360,3-6 0,11 0 360,20 6 0,-6-17 0,-27 23 0,28 1 0,1-2 0,-29-11 2198,27 9-2198,-18-9 811,15 12-811,0 0 0,-15 0 0,53 0 0,-29 0 0,8 0 0,-2 0 0,3 0 0,14 0 0,-12 0 0,-5 0 0,-12 0 0,-9 0 0,-3 12 0,21-9 0,-15 9 0,44-12 0,-33 0 0,7 0 0,-12 0 0,-9 0 0,20 0 0,-20 0 0,33 0 0,-19 0 0,10 0 0,8 0 0,-29 0 0,30 0 0,-39 11 0,-9 1 0,-5-6 0,7 7 0,-1-2 0,23-11 0,6 0 0,-9 12 0,5-9 0,4 8 0,29 13 0,-29-18 0,32 17 0,-32-23 0,29 0 0,-41 12 0,6 14 0,8-8 0,-14 6 0,9 34 0,-6-43 0,3 44 0,17-47 0,1-9 0,17 8 0,-18-11 0,13 24 0,-16-7 0,10 10 0,-19-15 0,33-12 0,-8 0 0</inkml:trace>
+  <inkml:trace contextRef="#ctx0" brushRef="#br0" timeOffset="7332">21378 9208 24575,'66'0'0,"0"0"0,-1 0 0,-22 0 0,0 0 0,12 0 0,7 0 0,0 0-680,-8 0 0,-2 0 1,1 0 679,-3 0 0,0 0 0,3 0 0,12 0 0,3 0 0,-2 0 0,-4 0 0,-2 0 0,-8 0 328,-12 0 0,-4 0-328,4 0 0,-3 0 0,10 0 336,-41 0-336,29 0 0,-32 0 0,9 0 1047,23 0-1047,9 0 0,24 0 0,-27 0 0,6 0 0,-6 0 0,-9 0 0,39 0 0,-27 0 0,24 0 0,-16 0 0,-2 23 0,-32-17 0,6 17 0,-24-23 0</inkml:trace>
+  <inkml:trace contextRef="#ctx0" brushRef="#br0" timeOffset="10200">15690 10425 24575,'41'0'0,"-2"0"0,7 0 0,14 0 0,12 0-1639,-17 0 1,9 0-1,6 0 1,3 0 0,-1 0-1,-3 0 1390,-5 0 1,-2 0 0,0 0 0,1 0-1,3 0 1,2 0-22,0 0 1,1 0 0,3 0-1,2 0 1,1 0 0,2 0 0,1 0-1,0 0 270,-12 0 0,2 0 0,0 0 0,1 0 0,1 0 0,1 0 0,0 0 0,1 0 0,1 0 0,-1 0 0,1 0-68,-5 0 0,0 0 1,1 0-1,0 0 1,1 0-1,0 0 1,0 0-1,1 0 0,0 0 1,-1 0-1,0 0 1,0 0-1,0 0 68,4 0 0,1 0 0,-1 0 0,1 0 0,-1 0 0,1 0 0,-1 0 0,0 0 0,0 0 0,0 0 0,0 0 0,0 0-170,-2 0 1,2 0 0,0 0 0,1 0 0,-1 0 0,0 0 0,-1 0 0,-1 0 0,-1 0 0,-2 0 0,-3 0 0,-2 0 169,17 0 0,-5 0 0,-3 0 0,-1 0 0,-1 0 0,1 0 0,3 0 46,-1-1 1,1 1 0,1 0-1,1 0 1,-1 0 0,0 0-1,-3 0 1,-3 1-47,8 0 0,-3 1 0,-2 0 0,-1 1 0,-1-1 0,-2-1 195,7 0 0,-1-1 1,-1 0-1,-6 1 0,-8 0-195,24 6 0,-21-2 2697,-28-5-2697,-32 0 1008,33 0 0,-31 0 1,19 0-1</inkml:trace>
+  <inkml:trace contextRef="#ctx0" brushRef="#br0" timeOffset="34784">11774 14182 24575,'53'0'0,"-12"0"0,-4 0 0,11 0-1967,9 0 1,14 0 0,7 0 0,1 0 0,-8 0 1593,-6 0 1,-5 0-1,2 0 1,10 0 372,-15 0 0,8 0 0,4 0 0,4 0 0,1 0 0,0 0 0,-2 0 0,-3 0 0,-5 0-360,7 0 1,-4 0 0,-2 0 0,-2 0 0,0 0 0,2 0 359,1 0 0,-1 0 0,1 0 0,0 0 0,-1 0 0,1 0 227,2 0 1,4 0 0,-1 0-1,-2 0 1,-6 0 0,-9 0-228,16 0 0,-5 0-137,4 0 1,3 0-1,-22 0 137,-32 0 3943,17 0-3943,-8 0 5897,14 0-5897,23 0 0,4 0 0,-12 0 839,-12 0 0,-3 0-839,-6 0 1002,15 0-1002,-14 0 0,-31 0 0,31 0 0,-33 0 0,44 23 0,-15-17 0,9 18 0,6-24 0,-41 0 0,18 0 0,-13 0 0,-8 0 0,9 0 0</inkml:trace>
+  <inkml:trace contextRef="#ctx0" brushRef="#br0" timeOffset="39464">3281 15346 24575,'68'0'0,"1"0"0,-1 0 0,0 0 0,-8 0 0,3 0 0,2 0 0,3 0 0,1 0 0,1 0 0,0 0-1229,-1 0 0,1 0 0,1 0 0,1 0 1,1 0-1,1 0 0,1 0 0,0 0 1080,-8 0 0,2 0 0,1 0 0,1 0 0,1 0 0,-1 0 0,-1 0 0,-1 0 0,-2 0 0,-2 0-159,10 0 0,-3 0 0,-1 0 0,-2 0 1,0 0-1,1 0 0,1 0 308,3 0 0,2 0 0,-1 0 0,1 0 0,0 0 0,-2 0 0,-2 0-147,2 0 1,0 0-1,-2 0 1,-1 0 0,0 0-1,-1 0 147,-2 0 0,1 0 0,-1 0 0,-1 0 0,-4 0 0,-4 0 0,21 0 0,-7 0 0,-6 0 0,10 0 0,-18 0 0,-36 0 0</inkml:trace>
+</inkml:ink>
+</file>
+
+<file path=ppt/ink/ink4.xml><?xml version="1.0" encoding="utf-8"?>
+<inkml:ink xmlns:inkml="http://www.w3.org/2003/InkML">
+  <inkml:definitions>
+    <inkml:context xml:id="ctx0">
+      <inkml:inkSource xml:id="inkSrc0">
+        <inkml:traceFormat>
+          <inkml:channel name="X" type="integer" min="-2.14748E9" max="2.14748E9" units="cm"/>
+          <inkml:channel name="Y" type="integer" min="-2.14748E9" max="2.14748E9" units="cm"/>
+          <inkml:channel name="F" type="integer" max="32767" units="dev"/>
+        </inkml:traceFormat>
+        <inkml:channelProperties>
+          <inkml:channelProperty channel="X" name="resolution" value="1000" units="1/cm"/>
+          <inkml:channelProperty channel="Y" name="resolution" value="1000" units="1/cm"/>
+          <inkml:channelProperty channel="F" name="resolution" value="0" units="1/dev"/>
+        </inkml:channelProperties>
+      </inkml:inkSource>
+      <inkml:timestamp xml:id="ts0" timeString="2023-10-05T08:16:26.002"/>
+    </inkml:context>
+    <inkml:brush xml:id="br0">
+      <inkml:brushProperty name="width" value="0.05292" units="cm"/>
+      <inkml:brushProperty name="height" value="0.05292" units="cm"/>
+      <inkml:brushProperty name="color" value="#FF0000"/>
+    </inkml:brush>
+  </inkml:definitions>
+  <inkml:trace contextRef="#ctx0" brushRef="#br0">14737 10239 24575,'0'-38'0,"0"9"0,0-21 0,0 32 0,0-41 0,0 15 0,-23-23 0,20 27 0,0 3 0,-21-7 0,24-18 0,0 21 0,0 0 0,0 15 0,0-21 0,0 14 0,0-5 0,0 0 0,0 5 0,0-37 0,0 38 0,0-5 0,0-3 0,0-27 0,0 11 0,0 17 0,0-19 0,0 46 0,0-47 0,-11 56 0,-16-32 0,10 17 0,-7-32 0,24 33 0,-12-19 0,9 33 0,-32-32 0,29 6 0,-41-1 0,29-5 0,-8 32 0,-21-32 0,3 17 0,0-8 0,-15 14 0,30 12 0,-1 0 0,7 0 0,11 0 0,-15 0 0,-2 0 0,3 0 0,14 0 0,-12 0 0,18 0 0,-29 0 0,-27 0 0,1-24 0,16 21 0,-1 1 0,7-11 0,1 2 0,-29 11 0,27-6 0,0 0 0,-27 3 0,22-3 0,1 1 0,-14 5 0,13 0 0,1 0 0,-12 0 0,15-24 0,6 18 0,32-17 0,-44 23 0,15 0 0,-16 0 0,-4 0 0,-22 0 0,35 0 0,-1 0 0,-9 0 0,1 0 0,-14 0 0,12 0 0,-3 0 0,6 0 0,3 0 0,-15 0 0,9 0 0,3 0 0,3 0 0,-16 0 0,-6 0 0,21 1 0,-1-2-271,-12-5 0,-7-3 0,2 0 271,-5 0 0,-5 1-494,6 1 1,-9 0 0,-2 0-1,8 1 494,11 1 0,4 1 0,-4 1 0,-10 2 0,-7 1 0,1 1 0,13-1 0,5 0 0,8 0 0,-3 0 0,1 0-119,4 0 1,0 0 118,-10 1 0,-7-2 0,5-3 0,-8-3 0,-2 0 0,3 2-1342,-8 2 0,2 2 0,-3-1 1342,18-2 0,-3-1 0,-2-1 0,1 1 0,1 1 0,-7 3 0,1 1 0,1 1 0,2-1 0,4 0 0,2 0 0,0 0 0,0 0 0,-2 0 0,-3 0 0,4 0 0,5 0 143,-11 0 0,11 0-143,0 0 1530,29 0-1530,-11 0 207,-9 0-207,5 12 0,-2 0 2316,2-9 0,-1 0-2316,-6 9 0,1-1 395,-14-11-395,-14 0 0,20 0 0,20 0 0,-14 0 0,-14 0 0,-1 0 0,16 0 0,1 0 0,-8 0 0,13 1 0,-6-2 0,-25-9 0,-2-3 0,24 4 0,-2 0 0,-1 0 0,-5 0 0,11 1 0,2-4 0,-9 12 0,11-11 0,-2-2-381,4 10 1,-5 1 380,-18-6 0,-9-1 0,4 2 0,4 6 0,2 2 0,2-1 0,-3 0 0,12 0 0,7 0 0,-26 0-23,26 0 23,-15 1 0,-9-2 0,0-5 0,-2 0-1234,18 5 1,-2 0 0,-2 0 1233,-5-1 0,-3-1 0,-2-3 0,9-5 0,-2-2 0,-1 0 0,1 3 0,-12 4 0,0 5 0,-1-4 0,8-6 0,-2-3 0,1 1 0,4 4 0,1 6 0,4 4 0,-2 1-624,-10-2 0,-1 0 0,1 0 624,7 0 0,3 0 0,-3 0 0,-8 0 0,-3 0 0,4 0 0,-10 0 0,7 0 0,22 0 0,3 0 205,0 0 1,-2 0-206,-14 0 0,-5 0 0,12 0 0,-3 0 0,1 0 5,-3 0 1,0 0-1,3 0-5,-17 0 0,10 0 3366,8 0-3366,-6 0 2375,45 0-2375,-7 0 188,1 0-188,5 0 0,-32 0 0,21 0 0,2 0 0,-8 0 0,17 0 0,-43 0 0,16 0 0,4 0 0,18 0 0,23 0 0,-24 0 0,-17 47 0,9-35 0,5 18 0,7-2 0,17-25 0,-44 9 0,14-12 0,-4 11 0,-2 2 0,-17-8 0,15 19 0,6-24 0,8 12 0,-2 14 0,2 4 0,-8 20 0,6 2 0,9-18 0,-1 0 0,-12 5 0,4 1 0,18 7 0,1-2-426,-25 13 426,23-19 0,0-4 0,-5-6 0,-10-1 0,4 6 0,26 13 0,11 9 0,-1 2 0,2 7 0,2-3 0,-2-11 0,2-2 0,1 1 0,4 10 0,0 2 0,-8-11 0,-14 5 0,0 6 0,0-44 0,12 40 426,-9-25-426,9 8 0,-12-6 0,23 3 0,-17-17 0,18 38 0,-24-53 0,0 17 0,0 1 0,0-7 0,0 10 0,23 8 0,-17-29 0,29 29 0,-32-32 0,9 33 0,12-19 0,-7 33 0,33-9 0,-20 0 0,-4-14 0,9 20 0,-5-38 0,-1 50 0,-5-42 0,-24 10 0,11-16 0,-8-11 0,9 24 0,12-18 0,-18 41 0,17-41 0,-11 29 0,14-32 0,4 9 0,20 11 0,3-17 0,14 18 0,1-13 0,-15-8 0,-27 9 0,9-12 0,-29 0 0,30 24 0,-33-19 0,32 19 0,6-24 0,5 0 0,11 0-1696,-6 0 0,8 0 0,2 0 0,-3 0 1696,4 0 0,-2 0 0,3 0 0,0 0 0,2-1 0,3 1 0,1 1-405,-8 0 1,1 1-1,1 0 1,0 1 0,0 1 404,-1 0 0,-1 2 0,0 0 0,3-1 0,2 0 0,5-1 0,4-1 0,2-1 0,0 1 0,-1-1 0,-5 2 0,-2 0 0,-4 2 0,-1-1 0,0 0 0,0-2 0,4-1 0,1-2 0,0 0 0,-4-1 0,-6 0-112,-2 1 0,-5 0 1,0 0 111,9 0 0,0 0 0,-9 0 0,15 0 0,-2 0 0,-36 0 0,-5 0 5616,23 0-5616,-12-23 1468,7 19 1,4 2-1469,22-22 0,-31 23 0,5 2-394,17-1 0,10 0 1,0 0 393,0 0 0,1 0 0,6 0-823,-11 0 1,4 0 0,3 0 0,1 0-1,1 0 823,-8 0 0,1 0 0,1 0 0,0 0 0,0 0 0,0 0 0,1 0 0,-1 0 0,1 0 0,-1 0 0,0 0 0,-1 0 0,-3 0 0,0 0 0,0 0 0,-2 0 0,0 0 0,-2 0 0,6 0 0,-1 0 0,-1 0 0,-4 0 0,-6 0 0,2 0 0,-6 0 0,-3 0 0,13 0 0,-8 0 0,-2 0 0,-33 0 1381,30 0-1381,-41 24 4500,53-18-4500,-15 17 0,26-21 0,10-4-2095,-16 14 1,4 0 2094,-12-9 0,7-3 0,0 0 0,-4 3 0,-1 4 0,-3 2 0,3-2 0,-2-2 0,3-2 0,0-1 0,-4 0-53,-1-1 1,-3-1-1,-3 2 53,15 4 0,-5 0 0,-14-6 0,-3 0 0,12 0 0,3 0 0,-13 0 0,2 0 0,25 0 0,-30 0 0,0 0 0,24 0 0,-22 0 0,8 0 0,-21 0 0,21 0 0,-21 0 4148,-2 0-4148,8 0 199,-29 0-199,41 0 0,-29 0 0,32 0 0,-21 0 0,-3-12 0,21 9 0,11-3 0,11 0 0,-9 5 0,5 2 0,4-1-1504,0 0 0,5 0 1,1 0-1,-2 0 1504,-7 0 0,-1 0 0,0 0 0,-2 0 0,15 0 0,-1 0 0,-9 0 0,-11 0 0,-5 0 0,-2 0 0,-6 0 0,0 0 0,24 0 0,-15 0 0,-27 0 6015,9 0-6015,-29 0 0,53 0 0,-50 0 0,50 0 0,-54 0 0,54 0 0,-50 0 0,38 0 0,-20 0 0,2 0 0,21 0 0,-9 0 0,-11-23 0,-7 17 0,-11-18 0,-9 24 0,32 0 0,6-23 0,27 17 0,-16-5 0,14-6 0,1 0 0,-8 3-290,1 3 1,0 2 289,-4 0 0,8 1 0,-2-2 0,-11-2 0,-8-7 0,-10 3 0,-1 10 0,27-17 0,-53 23 0,18-12 0,-13 9 0,-8-9 0,33 12 579,-19 0-579,33-23 0,-32 17 0,10-23 0,3-1 0,1 21 0,9-50 0,-6 42 0,-8-10 0,-10-8 0,7 29 0,-24-53 0,0 27 0,0-9 0,0 6 0,0 8 0,-24-2 0,19 2 0,-19-8 0,12 29 0,9-29 0,-8 32 0,11-9 0,0 12 0,0 0 0</inkml:trace>
+  <inkml:trace contextRef="#ctx0" brushRef="#br0" timeOffset="47782">26194 13441 24575,'-24'-15'0,"18"-20"0,-29 17 0,9-32 0,-27 9 0,20 0 0,5 15 0,-2 2 0,-12-5 0,-2 2 0,-17-8 0,31 29 0,4-18 0,-10 24 0,7 0 0,-12 0 0,14 0 0,-8 0 0,18 0 0,-10 0 0,-8-11 0,17 8 0,-32-9 0,-3-12 0,-3 19 0,15-19 0,6 24 0,-3-35 0,-6 26 0,2-26 0,-5 35 0,30 0 0,-10-24 0,16 18 0,-13-17 0,-17 11 0,-3-14 0,-18 8 0,44-6 0,-29 13 0,42 8 0,-31-9 0,33 12 0,-32 0 0,17-24 0,-43 19 0,40-43 0,-38 43 0,53-19 0,-41 24 0,41 0 0,-29 0 0,9 0 0,8-12 0,-17 9 0,32-8 0,-32 11 0,17 0 0,-44 0 0,-5-24 0,28 20 0,-5 2 0,-15-5 0,-9-3 0,10 4 0,-10 6 0,12-3 0,-9-2 0,10 1 0,-4 1-737,-4-14 0,-3-1 737,27 15 0,2 0 0,-12-8 0,0-2-364,7 6 1,-4 3 363,-3 2 0,-5 2 0,-1-1 0,-1-3 0,-1-1 0,-1 2 0,-8 2 0,-1 1 0,-6 1 0,14-1 0,-5 0 0,-2 0 0,2 0 0,6 0-1923,-9 0 0,5 0 1,-6 0 1922,5 0 0,-7 0 0,-1 0 0,2 0 0,7 0 0,-6 0 0,7 0 0,1 0-403,8 0 1,1 0 0,2 0 402,-19 0 0,9 0 876,6 0-876,3 0 485,21 0-485,-45 0 0,16 0 5840,2 0-5840,-15 0 1975,27 0-1975,-24 0 0,15 0 0,27 0 0,-9 0 0,29 0 0,-53 0 0,15 0 0,-24 0 0,-4 5 0,-3 2 0,33-6 0,-1 1-743,-12 1 0,-7 2 0,6-2 743,6-2 0,3-2 0,-17 1 0,-2 0 0,5 0 0,2 0 0,4 0 0,1 0 0,1 0 0,3 0 0,-18 0 0,16 0 0,-10 0 0,23 0 0,-2 0 0,-32 0 0,23 11 0,0 2 0,-18 4 1036,1 10-1036,25-20 0,-4-2 0,-18 5 0,-2 3-92,2 6 1,-1 3 91,16-4 0,0 2 0,3-2 0,-8 4 0,5-3 0,-19 5 0,29-23 0,2-2 0,-7 1 0,-18 12 1181,21-9-1181,11 8 195,7-11-195,11 0 0,-26 0 0,-18 0 0,8 0 0,-10 0 0,2 0-1265,-11 0 1,-1 0 1264,16 0 0,-2 0 0,1 0 0,-25-3 0,9 6 0,17 21 0,-12-22 0,7 2 0,33 19 0,-34-23 0,55 0 0,-33 0 2529,31 0-2529,-31 12 0,10-9 0,8 9 0,-17-12 0,8 23 0,-25-17 0,19 18 0,-26-24 0,42 0 0,-33 11 0,-3-8 0,-3 9 0,15-12 0,6 0 0,32 0 0,-33 24 0,31-18 0,-31 17 0,10-23 0,8 24 0,-5-19 0,11 19 0,-15-12 0,-26 26 0,21 6 0,0-17 0,5-1 0,21 0 0,-29 33 0,32-35 0,-32 26 0,29-15 0,-17-29 0,11 29 0,9-32 0,-9 32 0,12-29 0,-23 30 0,17-34 0,-18 10 0,24 35 0,-23-35 0,17 35 0,6-12 0,6-26 0,17 38 0,-23-20 0,24-10 0,-18 19 0,17-34 0,-23 34 0,0-30 0,0 29 0,12-9 0,-9 16 0,9-13 0,11 6 0,-5-32 0,8 32 0,-14-17 0,11 9 0,-17 8 0,30-29 0,-33 29 0,8-32 0,13 9 0,-18 11 0,17-17 0,1 41 0,-7-41 0,10 18 0,-15-13 0,11-8 0,-5 9 0,8-12 0,21 0 0,-14 0 0,4 0 0,2 0 0,17 0 0,-3 0 0,-3 0 0,-21 0 0,-2 0 0,-16 0 0,13 0 0,-18 0 0,41 0 0,-30 0 0,33 0 0,-20 0 0,20 0 0,-21 0 0,-2 0 0,31 0 0,-34 0 0,26 0 0,-38 0 0,-12 0 0,23 0 0,-5 0 0,44 0 0,5 0 0,-8 0 0,-16 0 0,-1 0 0,2 0 0,9 0 0,-3 0 0,-9 0 0,24 0 0,3 0 0,-12 0 0,5 0 0,-43 0 0,17 0 0,-8 0 0,14 0 0,0 0 0,-15 0 0,10-12 0,-19 9 0,33-8 0,3 11 0,3 0 0,-17 0 0,-1 0 0,6 0 0,17 0 0,-8 0 0,15 0 0,0 0 0,-27 0 0,-18 0 0,-11 0 0,14 0 0,33 0 0,6 0 0,8 0 0,1 5 0,-1 1 0,-5-3 0,0 9 0,-27-12 0,-6 0 0,3 0 0,6 0 0,-7 0 0,3 0 0,6 0 0,-1 0 0,17 0 0,-5 0 0,-6 0 0,-27 0 0,23 0 0,-35 0 0,14 0 0,27 0 0,-9 0 0,30 0 0,-30 23 0,21-17 0,-24 18 0,9-24 0,3 0 0,-21 0 0,38 0 0,-25 0 0,-1 0 0,14 0 0,-16 0 0,17 0 0,8 0 0,-15 0 0,2 0-498,4 0 1,7 0 0,0 0 497,4-1 0,1 1 0,0 1-1076,-3 2 1,0 2 0,-1-1 1075,-7-3 0,-1-1 0,-2 2 0,24 4 0,-16-1 0,-37-5 0,43 0 0,-20 0 0,9 0 619,-14 0 1,1 0-620,-5 0 0,-3 0 3479,18 0-3479,6 0 0,-44 0 0,29 0 0,-30 24 0,33-18 0,-20 17 0,31-23 0,-40 0 0,38 0 0,-30 12 0,12-9 0,-14 9 0,8-12 0,-29 0 0,29 0 0,-32 0 0,44 0 0,9 0 0,3 0 0,4 0 0,-6 0 0,-27 0 0,16 0 0,2 0 0,-7 0 0,15 0 0,-17 0 0,-2 0 0,7 0 0,18 0 0,-44 0 0,29 0 0,-41 0 0,29 0 0,-8 0 0,25 0 0,-7 0 0,-4 0 0,3 0 0,15 0 0,8 0 0,-5 0 0,-44 0 0,17 0 0,-32 0 0,9 0 0,11 0 0,6 0 0,1 0 0,5 0 0,-8 0 0,-10 0 0,7 0 0,11-12 0,-14-15 0,40-2 0,-43 3 0,17 14 0,-8-12 0,14 18 0,0-29 0,9 9 0,-32 8 0,40-5 0,-49 23 0,38 0 0,-44 0 0,9 0 0,12 0 0,5 0 0,12 0 0,9-24 0,3 18 0,-9-17 0,-6 23 0,-2-12 0,-7 9 0,0-32 0,7 29 0,-33-18 0,32 24 0,-29 0 0,17 0 0,-23-11 0,12 8 0,-9-9 0,32 12 0,6-24 0,27 18 0,-33-12 0,-2 1 0,8 14 0,-6-9 0,-8-11 0,2 17 0,-3-17 0,-14 23 0,12-24 0,-18 6 0,41-32 0,-30 21 0,10-21 0,20-3 0,-38 21 0,26-3 0,-35-1 0,0-8 0,11-22 0,1-6 0,-9 30 0,0 2 0,10-18 0,-2 4 0,-11 4 0,0 21 0,0-21 0,0 32 0,0-17 0,0 32 0,0-9 0,0 12 0</inkml:trace>
+</inkml:ink>
+</file>
+
 <file path=ppt/notesMasters/notesMaster1.xml><?xml version="1.0" encoding="utf-8"?>
 <p:notesMaster xmlns:a="http://schemas.openxmlformats.org/drawingml/2006/main" xmlns:r="http://schemas.openxmlformats.org/officeDocument/2006/relationships" xmlns:p="http://schemas.openxmlformats.org/presentationml/2006/main">
   <p:cSld>
@@ -218,7 +336,7 @@
           <a:p>
             <a:fld id="{1DF8EB0A-3D88-47AF-8B37-7E6EB8CD0DC9}" type="datetimeFigureOut">
               <a:rPr lang="vi-VN" smtClean="0"/>
-              <a:t>04/10/2023</a:t>
+              <a:t>05/10/2023</a:t>
             </a:fld>
             <a:endParaRPr lang="vi-VN"/>
           </a:p>
@@ -632,7 +750,7 @@
           <a:p>
             <a:fld id="{EB8135D3-0DC7-472E-9E95-8EBB926A0EB6}" type="datetime1">
               <a:rPr lang="vi-VN" smtClean="0"/>
-              <a:t>04/10/2023</a:t>
+              <a:t>05/10/2023</a:t>
             </a:fld>
             <a:endParaRPr lang="vi-VN"/>
           </a:p>
@@ -830,7 +948,7 @@
           <a:p>
             <a:fld id="{8596560B-899E-429A-84F2-41ABFB82A5A9}" type="datetime1">
               <a:rPr lang="vi-VN" smtClean="0"/>
-              <a:t>04/10/2023</a:t>
+              <a:t>05/10/2023</a:t>
             </a:fld>
             <a:endParaRPr lang="vi-VN"/>
           </a:p>
@@ -1038,7 +1156,7 @@
           <a:p>
             <a:fld id="{1709AC3F-2674-49D3-A873-07AA9E5DCF06}" type="datetime1">
               <a:rPr lang="vi-VN" smtClean="0"/>
-              <a:t>04/10/2023</a:t>
+              <a:t>05/10/2023</a:t>
             </a:fld>
             <a:endParaRPr lang="vi-VN"/>
           </a:p>
@@ -1236,7 +1354,7 @@
           <a:p>
             <a:fld id="{6D500D8F-B0AE-4366-9341-7B6F0640C2BE}" type="datetime1">
               <a:rPr lang="vi-VN" smtClean="0"/>
-              <a:t>04/10/2023</a:t>
+              <a:t>05/10/2023</a:t>
             </a:fld>
             <a:endParaRPr lang="vi-VN"/>
           </a:p>
@@ -1511,7 +1629,7 @@
           <a:p>
             <a:fld id="{13C0DA7A-F9FE-4C1E-A471-7C38F755C552}" type="datetime1">
               <a:rPr lang="vi-VN" smtClean="0"/>
-              <a:t>04/10/2023</a:t>
+              <a:t>05/10/2023</a:t>
             </a:fld>
             <a:endParaRPr lang="vi-VN"/>
           </a:p>
@@ -1776,7 +1894,7 @@
           <a:p>
             <a:fld id="{D9A61B5A-4066-4776-A7F8-F246FF6DE426}" type="datetime1">
               <a:rPr lang="vi-VN" smtClean="0"/>
-              <a:t>04/10/2023</a:t>
+              <a:t>05/10/2023</a:t>
             </a:fld>
             <a:endParaRPr lang="vi-VN"/>
           </a:p>
@@ -2188,7 +2306,7 @@
           <a:p>
             <a:fld id="{431C399D-8096-48E3-98E2-6EA85002E14F}" type="datetime1">
               <a:rPr lang="vi-VN" smtClean="0"/>
-              <a:t>04/10/2023</a:t>
+              <a:t>05/10/2023</a:t>
             </a:fld>
             <a:endParaRPr lang="vi-VN"/>
           </a:p>
@@ -2329,7 +2447,7 @@
           <a:p>
             <a:fld id="{F1836DE2-13AF-4AB3-8918-00D6109ABC25}" type="datetime1">
               <a:rPr lang="vi-VN" smtClean="0"/>
-              <a:t>04/10/2023</a:t>
+              <a:t>05/10/2023</a:t>
             </a:fld>
             <a:endParaRPr lang="vi-VN"/>
           </a:p>
@@ -2442,7 +2560,7 @@
           <a:p>
             <a:fld id="{0A8FCF89-8CC3-4338-8ED2-C415082D670C}" type="datetime1">
               <a:rPr lang="vi-VN" smtClean="0"/>
-              <a:t>04/10/2023</a:t>
+              <a:t>05/10/2023</a:t>
             </a:fld>
             <a:endParaRPr lang="vi-VN"/>
           </a:p>
@@ -2753,7 +2871,7 @@
           <a:p>
             <a:fld id="{9B246DAD-E1C2-4AE1-9631-2D4DF36CDBB1}" type="datetime1">
               <a:rPr lang="vi-VN" smtClean="0"/>
-              <a:t>04/10/2023</a:t>
+              <a:t>05/10/2023</a:t>
             </a:fld>
             <a:endParaRPr lang="vi-VN"/>
           </a:p>
@@ -3041,7 +3159,7 @@
           <a:p>
             <a:fld id="{EEC90FF2-7BE5-44CC-AFD7-2A4F808E557C}" type="datetime1">
               <a:rPr lang="vi-VN" smtClean="0"/>
-              <a:t>04/10/2023</a:t>
+              <a:t>05/10/2023</a:t>
             </a:fld>
             <a:endParaRPr lang="vi-VN"/>
           </a:p>
@@ -3282,7 +3400,7 @@
           <a:p>
             <a:fld id="{BE99BEBD-4040-4E3E-861A-483E2C55E883}" type="datetime1">
               <a:rPr lang="vi-VN" smtClean="0"/>
-              <a:t>04/10/2023</a:t>
+              <a:t>05/10/2023</a:t>
             </a:fld>
             <a:endParaRPr lang="vi-VN"/>
           </a:p>
@@ -3723,7 +3841,7 @@
           <a:p>
             <a:r>
               <a:rPr lang="en-VN"/>
-              <a:t>SE113. Practice class part 1 –Requirements Engineer Tool</a:t>
+              <a:t>SE357. Requirements Engineer Tool</a:t>
             </a:r>
           </a:p>
         </p:txBody>
@@ -4043,6 +4161,57 @@
           </a:p>
         </p:txBody>
       </p:sp>
+      <mc:AlternateContent xmlns:mc="http://schemas.openxmlformats.org/markup-compatibility/2006">
+        <mc:Choice xmlns:p14="http://schemas.microsoft.com/office/powerpoint/2010/main" Requires="p14">
+          <p:contentPart p14:bwMode="auto" r:id="rId2">
+            <p14:nvContentPartPr>
+              <p14:cNvPr id="5" name="Ink 4">
+                <a:extLst>
+                  <a:ext uri="{FF2B5EF4-FFF2-40B4-BE49-F238E27FC236}">
+                    <a16:creationId xmlns:a16="http://schemas.microsoft.com/office/drawing/2014/main" id="{63A8CF09-1222-651F-3291-E45A66ED635E}"/>
+                  </a:ext>
+                </a:extLst>
+              </p14:cNvPr>
+              <p14:cNvContentPartPr/>
+              <p14:nvPr/>
+            </p14:nvContentPartPr>
+            <p14:xfrm>
+              <a:off x="390600" y="2999520"/>
+              <a:ext cx="4134240" cy="754200"/>
+            </p14:xfrm>
+          </p:contentPart>
+        </mc:Choice>
+        <mc:Fallback>
+          <p:pic>
+            <p:nvPicPr>
+              <p:cNvPr id="5" name="Ink 4">
+                <a:extLst>
+                  <a:ext uri="{FF2B5EF4-FFF2-40B4-BE49-F238E27FC236}">
+                    <a16:creationId xmlns:a16="http://schemas.microsoft.com/office/drawing/2014/main" id="{63A8CF09-1222-651F-3291-E45A66ED635E}"/>
+                  </a:ext>
+                </a:extLst>
+              </p:cNvPr>
+              <p:cNvPicPr/>
+              <p:nvPr/>
+            </p:nvPicPr>
+            <p:blipFill>
+              <a:blip r:embed="rId3"/>
+              <a:stretch>
+                <a:fillRect/>
+              </a:stretch>
+            </p:blipFill>
+            <p:spPr>
+              <a:xfrm>
+                <a:off x="381240" y="2990160"/>
+                <a:ext cx="4152960" cy="772920"/>
+              </a:xfrm>
+              <a:prstGeom prst="rect">
+                <a:avLst/>
+              </a:prstGeom>
+            </p:spPr>
+          </p:pic>
+        </mc:Fallback>
+      </mc:AlternateContent>
     </p:spTree>
     <p:extLst>
       <p:ext uri="{BB962C8B-B14F-4D97-AF65-F5344CB8AC3E}">
@@ -4290,6 +4459,57 @@
           </a:p>
         </p:txBody>
       </p:sp>
+      <mc:AlternateContent xmlns:mc="http://schemas.openxmlformats.org/markup-compatibility/2006">
+        <mc:Choice xmlns:p14="http://schemas.microsoft.com/office/powerpoint/2010/main" Requires="p14">
+          <p:contentPart p14:bwMode="auto" r:id="rId2">
+            <p14:nvContentPartPr>
+              <p14:cNvPr id="5" name="Ink 4">
+                <a:extLst>
+                  <a:ext uri="{FF2B5EF4-FFF2-40B4-BE49-F238E27FC236}">
+                    <a16:creationId xmlns:a16="http://schemas.microsoft.com/office/drawing/2014/main" id="{A102D435-7B0B-691D-A8A6-F81EDF479886}"/>
+                  </a:ext>
+                </a:extLst>
+              </p14:cNvPr>
+              <p14:cNvContentPartPr/>
+              <p14:nvPr/>
+            </p14:nvContentPartPr>
+            <p14:xfrm>
+              <a:off x="5172120" y="1675800"/>
+              <a:ext cx="1667160" cy="972360"/>
+            </p14:xfrm>
+          </p:contentPart>
+        </mc:Choice>
+        <mc:Fallback>
+          <p:pic>
+            <p:nvPicPr>
+              <p:cNvPr id="5" name="Ink 4">
+                <a:extLst>
+                  <a:ext uri="{FF2B5EF4-FFF2-40B4-BE49-F238E27FC236}">
+                    <a16:creationId xmlns:a16="http://schemas.microsoft.com/office/drawing/2014/main" id="{A102D435-7B0B-691D-A8A6-F81EDF479886}"/>
+                  </a:ext>
+                </a:extLst>
+              </p:cNvPr>
+              <p:cNvPicPr/>
+              <p:nvPr/>
+            </p:nvPicPr>
+            <p:blipFill>
+              <a:blip r:embed="rId3"/>
+              <a:stretch>
+                <a:fillRect/>
+              </a:stretch>
+            </p:blipFill>
+            <p:spPr>
+              <a:xfrm>
+                <a:off x="5162760" y="1666440"/>
+                <a:ext cx="1685880" cy="991080"/>
+              </a:xfrm>
+              <a:prstGeom prst="rect">
+                <a:avLst/>
+              </a:prstGeom>
+            </p:spPr>
+          </p:pic>
+        </mc:Fallback>
+      </mc:AlternateContent>
     </p:spTree>
     <p:extLst>
       <p:ext uri="{BB962C8B-B14F-4D97-AF65-F5344CB8AC3E}">
@@ -4463,6 +4683,57 @@
           </a:p>
         </p:txBody>
       </p:sp>
+      <mc:AlternateContent xmlns:mc="http://schemas.openxmlformats.org/markup-compatibility/2006">
+        <mc:Choice xmlns:p14="http://schemas.microsoft.com/office/powerpoint/2010/main" Requires="p14">
+          <p:contentPart p14:bwMode="auto" r:id="rId2">
+            <p14:nvContentPartPr>
+              <p14:cNvPr id="5" name="Ink 4">
+                <a:extLst>
+                  <a:ext uri="{FF2B5EF4-FFF2-40B4-BE49-F238E27FC236}">
+                    <a16:creationId xmlns:a16="http://schemas.microsoft.com/office/drawing/2014/main" id="{2362E3EE-6AC3-90BF-6CB5-919F3817ED95}"/>
+                  </a:ext>
+                </a:extLst>
+              </p14:cNvPr>
+              <p14:cNvContentPartPr/>
+              <p14:nvPr/>
+            </p14:nvContentPartPr>
+            <p14:xfrm>
+              <a:off x="1181160" y="2752560"/>
+              <a:ext cx="7248960" cy="2772360"/>
+            </p14:xfrm>
+          </p:contentPart>
+        </mc:Choice>
+        <mc:Fallback>
+          <p:pic>
+            <p:nvPicPr>
+              <p:cNvPr id="5" name="Ink 4">
+                <a:extLst>
+                  <a:ext uri="{FF2B5EF4-FFF2-40B4-BE49-F238E27FC236}">
+                    <a16:creationId xmlns:a16="http://schemas.microsoft.com/office/drawing/2014/main" id="{2362E3EE-6AC3-90BF-6CB5-919F3817ED95}"/>
+                  </a:ext>
+                </a:extLst>
+              </p:cNvPr>
+              <p:cNvPicPr/>
+              <p:nvPr/>
+            </p:nvPicPr>
+            <p:blipFill>
+              <a:blip r:embed="rId3"/>
+              <a:stretch>
+                <a:fillRect/>
+              </a:stretch>
+            </p:blipFill>
+            <p:spPr>
+              <a:xfrm>
+                <a:off x="1171800" y="2743200"/>
+                <a:ext cx="7267680" cy="2791080"/>
+              </a:xfrm>
+              <a:prstGeom prst="rect">
+                <a:avLst/>
+              </a:prstGeom>
+            </p:spPr>
+          </p:pic>
+        </mc:Fallback>
+      </mc:AlternateContent>
     </p:spTree>
     <p:extLst>
       <p:ext uri="{BB962C8B-B14F-4D97-AF65-F5344CB8AC3E}">
@@ -7276,6 +7547,57 @@
           </a:p>
         </p:txBody>
       </p:sp>
+      <mc:AlternateContent xmlns:mc="http://schemas.openxmlformats.org/markup-compatibility/2006">
+        <mc:Choice xmlns:p14="http://schemas.microsoft.com/office/powerpoint/2010/main" Requires="p14">
+          <p:contentPart p14:bwMode="auto" r:id="rId2">
+            <p14:nvContentPartPr>
+              <p14:cNvPr id="5" name="Ink 4">
+                <a:extLst>
+                  <a:ext uri="{FF2B5EF4-FFF2-40B4-BE49-F238E27FC236}">
+                    <a16:creationId xmlns:a16="http://schemas.microsoft.com/office/drawing/2014/main" id="{EBB25D42-6AF0-3594-9C3E-63B61A8D66D1}"/>
+                  </a:ext>
+                </a:extLst>
+              </p14:cNvPr>
+              <p14:cNvContentPartPr/>
+              <p14:nvPr/>
+            </p14:nvContentPartPr>
+            <p14:xfrm>
+              <a:off x="776880" y="2923200"/>
+              <a:ext cx="8653320" cy="2287440"/>
+            </p14:xfrm>
+          </p:contentPart>
+        </mc:Choice>
+        <mc:Fallback>
+          <p:pic>
+            <p:nvPicPr>
+              <p:cNvPr id="5" name="Ink 4">
+                <a:extLst>
+                  <a:ext uri="{FF2B5EF4-FFF2-40B4-BE49-F238E27FC236}">
+                    <a16:creationId xmlns:a16="http://schemas.microsoft.com/office/drawing/2014/main" id="{EBB25D42-6AF0-3594-9C3E-63B61A8D66D1}"/>
+                  </a:ext>
+                </a:extLst>
+              </p:cNvPr>
+              <p:cNvPicPr/>
+              <p:nvPr/>
+            </p:nvPicPr>
+            <p:blipFill>
+              <a:blip r:embed="rId3"/>
+              <a:stretch>
+                <a:fillRect/>
+              </a:stretch>
+            </p:blipFill>
+            <p:spPr>
+              <a:xfrm>
+                <a:off x="767520" y="2913840"/>
+                <a:ext cx="8672040" cy="2306160"/>
+              </a:xfrm>
+              <a:prstGeom prst="rect">
+                <a:avLst/>
+              </a:prstGeom>
+            </p:spPr>
+          </p:pic>
+        </mc:Fallback>
+      </mc:AlternateContent>
     </p:spTree>
     <p:extLst>
       <p:ext uri="{BB962C8B-B14F-4D97-AF65-F5344CB8AC3E}">

</xml_diff>